<commit_message>
updated k8s resources reference
</commit_message>
<xml_diff>
--- a/Day25/DockerAndKubernetes_Training-Day25.pptx
+++ b/Day25/DockerAndKubernetes_Training-Day25.pptx
@@ -199,7 +199,7 @@
           <a:p>
             <a:fld id="{B09F413D-6E72-4B8A-80ED-A580F7C91B71}" type="datetimeFigureOut">
               <a:rPr lang="en-IN" smtClean="0"/>
-              <a:t>09-05-2023</a:t>
+              <a:t>10-05-2023</a:t>
             </a:fld>
             <a:endParaRPr lang="en-IN"/>
           </a:p>
@@ -802,7 +802,7 @@
           <a:p>
             <a:fld id="{12E8600E-B0EE-4521-BF40-4B72FBA06775}" type="datetimeFigureOut">
               <a:rPr lang="en-IN" smtClean="0"/>
-              <a:t>09-05-2023</a:t>
+              <a:t>10-05-2023</a:t>
             </a:fld>
             <a:endParaRPr lang="en-IN"/>
           </a:p>
@@ -1891,7 +1891,7 @@
             <a:fld id="{49F3E739-D457-46E5-B626-C9B182A007EE}" type="datetimeFigureOut">
               <a:rPr lang="en-US" smtClean="0"/>
               <a:pPr/>
-              <a:t>5/9/2023</a:t>
+              <a:t>5/10/2023</a:t>
             </a:fld>
             <a:endParaRPr lang="en-US"/>
           </a:p>
@@ -2873,7 +2873,7 @@
             <a:fld id="{49F3E739-D457-46E5-B626-C9B182A007EE}" type="datetimeFigureOut">
               <a:rPr lang="en-US" smtClean="0"/>
               <a:pPr/>
-              <a:t>5/9/2023</a:t>
+              <a:t>5/10/2023</a:t>
             </a:fld>
             <a:endParaRPr lang="en-US"/>
           </a:p>
@@ -4009,7 +4009,7 @@
             <a:fld id="{49F3E739-D457-46E5-B626-C9B182A007EE}" type="datetimeFigureOut">
               <a:rPr lang="en-US" smtClean="0"/>
               <a:pPr/>
-              <a:t>5/9/2023</a:t>
+              <a:t>5/10/2023</a:t>
             </a:fld>
             <a:endParaRPr lang="en-US"/>
           </a:p>
@@ -5044,7 +5044,7 @@
             <a:fld id="{49F3E739-D457-46E5-B626-C9B182A007EE}" type="datetimeFigureOut">
               <a:rPr lang="en-US" smtClean="0"/>
               <a:pPr/>
-              <a:t>5/9/2023</a:t>
+              <a:t>5/10/2023</a:t>
             </a:fld>
             <a:endParaRPr lang="en-US"/>
           </a:p>
@@ -5706,7 +5706,7 @@
             <a:fld id="{49F3E739-D457-46E5-B626-C9B182A007EE}" type="datetimeFigureOut">
               <a:rPr lang="en-US" smtClean="0"/>
               <a:pPr/>
-              <a:t>5/9/2023</a:t>
+              <a:t>5/10/2023</a:t>
             </a:fld>
             <a:endParaRPr lang="en-US"/>
           </a:p>
@@ -6569,7 +6569,7 @@
             <a:fld id="{49F3E739-D457-46E5-B626-C9B182A007EE}" type="datetimeFigureOut">
               <a:rPr lang="en-US" smtClean="0"/>
               <a:pPr/>
-              <a:t>5/9/2023</a:t>
+              <a:t>5/10/2023</a:t>
             </a:fld>
             <a:endParaRPr lang="en-US"/>
           </a:p>
@@ -6760,7 +6760,7 @@
           <a:p>
             <a:fld id="{12E8600E-B0EE-4521-BF40-4B72FBA06775}" type="datetimeFigureOut">
               <a:rPr lang="en-IN" smtClean="0"/>
-              <a:t>09-05-2023</a:t>
+              <a:t>10-05-2023</a:t>
             </a:fld>
             <a:endParaRPr lang="en-IN"/>
           </a:p>
@@ -7732,7 +7732,7 @@
           <a:p>
             <a:fld id="{12E8600E-B0EE-4521-BF40-4B72FBA06775}" type="datetimeFigureOut">
               <a:rPr lang="en-IN" smtClean="0"/>
-              <a:t>09-05-2023</a:t>
+              <a:t>10-05-2023</a:t>
             </a:fld>
             <a:endParaRPr lang="en-IN"/>
           </a:p>
@@ -7943,7 +7943,7 @@
           <a:p>
             <a:fld id="{12E8600E-B0EE-4521-BF40-4B72FBA06775}" type="datetimeFigureOut">
               <a:rPr lang="en-IN" smtClean="0"/>
-              <a:t>09-05-2023</a:t>
+              <a:t>10-05-2023</a:t>
             </a:fld>
             <a:endParaRPr lang="en-IN"/>
           </a:p>
@@ -8977,7 +8977,7 @@
           <a:p>
             <a:fld id="{12E8600E-B0EE-4521-BF40-4B72FBA06775}" type="datetimeFigureOut">
               <a:rPr lang="en-IN" smtClean="0"/>
-              <a:t>09-05-2023</a:t>
+              <a:t>10-05-2023</a:t>
             </a:fld>
             <a:endParaRPr lang="en-IN"/>
           </a:p>
@@ -9249,7 +9249,7 @@
           <a:p>
             <a:fld id="{12E8600E-B0EE-4521-BF40-4B72FBA06775}" type="datetimeFigureOut">
               <a:rPr lang="en-IN" smtClean="0"/>
-              <a:t>09-05-2023</a:t>
+              <a:t>10-05-2023</a:t>
             </a:fld>
             <a:endParaRPr lang="en-IN"/>
           </a:p>
@@ -9660,7 +9660,7 @@
             <a:fld id="{49F3E739-D457-46E5-B626-C9B182A007EE}" type="datetimeFigureOut">
               <a:rPr lang="en-US" smtClean="0"/>
               <a:pPr/>
-              <a:t>5/9/2023</a:t>
+              <a:t>5/10/2023</a:t>
             </a:fld>
             <a:endParaRPr lang="en-US"/>
           </a:p>
@@ -9788,7 +9788,7 @@
           <a:p>
             <a:fld id="{12E8600E-B0EE-4521-BF40-4B72FBA06775}" type="datetimeFigureOut">
               <a:rPr lang="en-IN" smtClean="0"/>
-              <a:t>09-05-2023</a:t>
+              <a:t>10-05-2023</a:t>
             </a:fld>
             <a:endParaRPr lang="en-IN"/>
           </a:p>
@@ -9883,7 +9883,7 @@
           <a:p>
             <a:fld id="{12E8600E-B0EE-4521-BF40-4B72FBA06775}" type="datetimeFigureOut">
               <a:rPr lang="en-IN" smtClean="0"/>
-              <a:t>09-05-2023</a:t>
+              <a:t>10-05-2023</a:t>
             </a:fld>
             <a:endParaRPr lang="en-IN"/>
           </a:p>
@@ -10964,7 +10964,7 @@
           <a:p>
             <a:fld id="{12E8600E-B0EE-4521-BF40-4B72FBA06775}" type="datetimeFigureOut">
               <a:rPr lang="en-IN" smtClean="0"/>
-              <a:t>09-05-2023</a:t>
+              <a:t>10-05-2023</a:t>
             </a:fld>
             <a:endParaRPr lang="en-IN"/>
           </a:p>
@@ -12073,7 +12073,7 @@
             <a:fld id="{49F3E739-D457-46E5-B626-C9B182A007EE}" type="datetimeFigureOut">
               <a:rPr lang="en-US" smtClean="0"/>
               <a:pPr/>
-              <a:t>5/9/2023</a:t>
+              <a:t>5/10/2023</a:t>
             </a:fld>
             <a:endParaRPr lang="en-US"/>
           </a:p>
@@ -13072,7 +13072,7 @@
             <a:fld id="{49F3E739-D457-46E5-B626-C9B182A007EE}" type="datetimeFigureOut">
               <a:rPr lang="en-US" smtClean="0"/>
               <a:pPr/>
-              <a:t>5/9/2023</a:t>
+              <a:t>5/10/2023</a:t>
             </a:fld>
             <a:endParaRPr lang="en-US"/>
           </a:p>
@@ -13660,7 +13660,7 @@
           <a:p>
             <a:r>
               <a:rPr lang="en-US" sz="4800" b="1" i="1" dirty="0"/>
-              <a:t>DAY 24</a:t>
+              <a:t>DAY 25</a:t>
             </a:r>
             <a:endParaRPr lang="en-IN" sz="4800" b="1" i="1" dirty="0"/>
           </a:p>
@@ -13799,7 +13799,7 @@
         </p:spPr>
         <p:txBody>
           <a:bodyPr vert="horz" lIns="91440" tIns="45720" rIns="91440" bIns="45720" rtlCol="0">
-            <a:normAutofit fontScale="92500" lnSpcReduction="10000"/>
+            <a:normAutofit/>
           </a:bodyPr>
           <a:lstStyle>
             <a:lvl1pPr marL="342900" indent="-342900" algn="l" defTabSz="457200" rtl="0" eaLnBrk="1" latinLnBrk="0" hangingPunct="1">
@@ -14037,7 +14037,7 @@
           <a:p>
             <a:r>
               <a:rPr lang="en-US" dirty="0"/>
-              <a:t>Kubernetes – The Way Forward</a:t>
+              <a:t>Any Queries from previous session</a:t>
             </a:r>
           </a:p>
           <a:p>
@@ -14047,7 +14047,7 @@
             </a:pPr>
             <a:r>
               <a:rPr lang="en-US" dirty="0"/>
-              <a:t>Walkthrough of cluster creation</a:t>
+              <a:t>PODs understanding in details</a:t>
             </a:r>
           </a:p>
           <a:p>
@@ -14057,7 +14057,7 @@
             </a:pPr>
             <a:r>
               <a:rPr lang="en-US" dirty="0"/>
-              <a:t>Kubernetes Networking</a:t>
+              <a:t>Understanding common networking and common storage in POD (shared namespaces)</a:t>
             </a:r>
           </a:p>
           <a:p>
@@ -14067,84 +14067,9 @@
             </a:pPr>
             <a:r>
               <a:rPr lang="en-US" dirty="0"/>
-              <a:t>Container Network Interfaces</a:t>
+              <a:t>Sample application deployment using nginx for single container in POD</a:t>
             </a:r>
-          </a:p>
-          <a:p>
-            <a:pPr lvl="1">
-              <a:buFont typeface="Wingdings" panose="05000000000000000000" pitchFamily="2" charset="2"/>
-              <a:buChar char="Ø"/>
-            </a:pPr>
-            <a:r>
-              <a:rPr lang="en-US" dirty="0" err="1"/>
-              <a:t>ContainerD</a:t>
-            </a:r>
-            <a:r>
-              <a:rPr lang="en-US" dirty="0"/>
-              <a:t> understanding/installation steps</a:t>
-            </a:r>
-          </a:p>
-          <a:p>
-            <a:pPr lvl="1">
-              <a:buFont typeface="Wingdings" panose="05000000000000000000" pitchFamily="2" charset="2"/>
-              <a:buChar char="Ø"/>
-            </a:pPr>
-            <a:r>
-              <a:rPr lang="en-US" dirty="0"/>
-              <a:t>Kubernetes Course contents</a:t>
-            </a:r>
-          </a:p>
-          <a:p>
-            <a:pPr lvl="1">
-              <a:buFont typeface="Wingdings" panose="05000000000000000000" pitchFamily="2" charset="2"/>
-              <a:buChar char="Ø"/>
-            </a:pPr>
-            <a:r>
-              <a:rPr lang="en-US" dirty="0"/>
-              <a:t>API Details</a:t>
-            </a:r>
-          </a:p>
-          <a:p>
-            <a:pPr lvl="2">
-              <a:buFont typeface="Wingdings" panose="05000000000000000000" pitchFamily="2" charset="2"/>
-              <a:buChar char="Ø"/>
-            </a:pPr>
-            <a:r>
-              <a:rPr lang="en-US" dirty="0">
-                <a:hlinkClick r:id="rId2"/>
-              </a:rPr>
-              <a:t>https://kubernetes.io/docs/reference/using-api/</a:t>
-            </a:r>
-            <a:endParaRPr lang="en-US" dirty="0"/>
-          </a:p>
-          <a:p>
-            <a:pPr lvl="2">
-              <a:buFont typeface="Wingdings" panose="05000000000000000000" pitchFamily="2" charset="2"/>
-              <a:buChar char="Ø"/>
-            </a:pPr>
-            <a:r>
-              <a:rPr lang="en-US" dirty="0">
-                <a:hlinkClick r:id="rId3"/>
-              </a:rPr>
-              <a:t>https://kubernetes.io/docs/reference/generated/kubernetes-api/v1.21/</a:t>
-            </a:r>
-            <a:endParaRPr lang="en-US" dirty="0"/>
-          </a:p>
-          <a:p>
-            <a:pPr lvl="1">
-              <a:buFont typeface="Wingdings" panose="05000000000000000000" pitchFamily="2" charset="2"/>
-              <a:buChar char="Ø"/>
-            </a:pPr>
-            <a:r>
-              <a:rPr lang="en-US" dirty="0"/>
-              <a:t>Starting point - Pods</a:t>
-            </a:r>
-          </a:p>
-          <a:p>
-            <a:pPr marL="457200" lvl="1" indent="0">
-              <a:buNone/>
-            </a:pPr>
-            <a:endParaRPr lang="en-US" dirty="0"/>
+            <a:endParaRPr lang="en-US" sz="1800" dirty="0"/>
           </a:p>
           <a:p>
             <a:pPr marL="914400" lvl="2" indent="0">
@@ -14285,51 +14210,49 @@
           <a:p>
             <a:r>
               <a:rPr lang="en-US" dirty="0"/>
-              <a:t>CNCF - Cloud Native Computing Foundation</a:t>
+              <a:t>POD – Artifact</a:t>
             </a:r>
           </a:p>
           <a:p>
-            <a:pPr lvl="1">
-              <a:buFont typeface="Wingdings" panose="05000000000000000000" pitchFamily="2" charset="2"/>
-              <a:buChar char="Ø"/>
-            </a:pPr>
+            <a:pPr lvl="1"/>
             <a:r>
-              <a:rPr lang="en-US" dirty="0">
-                <a:hlinkClick r:id="rId2"/>
-              </a:rPr>
-              <a:t>https://www.cncf.io/</a:t>
+              <a:rPr lang="en-US" dirty="0"/>
+              <a:t>Refer agenda items</a:t>
+            </a:r>
+          </a:p>
+          <a:p>
+            <a:pPr lvl="1"/>
+            <a:r>
+              <a:rPr lang="en-US" dirty="0"/>
+              <a:t>Refer PODs folder for all </a:t>
+            </a:r>
+            <a:r>
+              <a:rPr lang="en-US" dirty="0" err="1"/>
+              <a:t>yaml</a:t>
+            </a:r>
+            <a:r>
+              <a:rPr lang="en-US" dirty="0"/>
+              <a:t> related details</a:t>
+            </a:r>
+          </a:p>
+          <a:p>
+            <a:pPr lvl="1"/>
+            <a:r>
+              <a:rPr lang="en-US" dirty="0"/>
+              <a:t>Pod vs Container </a:t>
+            </a:r>
+            <a:r>
+              <a:rPr lang="en-US"/>
+              <a:t>vs cluster</a:t>
             </a:r>
             <a:endParaRPr lang="en-US" dirty="0"/>
           </a:p>
           <a:p>
+            <a:pPr lvl="2"/>
             <a:r>
-              <a:rPr lang="it-IT" dirty="0"/>
-              <a:t>CNI Providers - </a:t>
+              <a:rPr lang="en-IN" dirty="0"/>
+              <a:t>https://enterprisersproject.com/article/2020/9/pod-cluster-container-what-is-difference</a:t>
             </a:r>
-          </a:p>
-          <a:p>
-            <a:pPr lvl="1">
-              <a:buFont typeface="Wingdings" panose="05000000000000000000" pitchFamily="2" charset="2"/>
-              <a:buChar char="Ø"/>
-            </a:pPr>
-            <a:r>
-              <a:rPr lang="it-IT" dirty="0"/>
-              <a:t>https://kubernetes.io/docs/concepts/cluster-administration/addons/#networking-and-network-policy</a:t>
-            </a:r>
-          </a:p>
-          <a:p>
-            <a:pPr lvl="1">
-              <a:buFont typeface="Wingdings" panose="05000000000000000000" pitchFamily="2" charset="2"/>
-              <a:buChar char="Ø"/>
-            </a:pPr>
-            <a:r>
-              <a:rPr lang="it-IT" dirty="0"/>
-              <a:t>https://kubevious.io/blog/post/comparing-kubernetes-container-network-interface-cni-providers</a:t>
-            </a:r>
-            <a:endParaRPr lang="en-IN" dirty="0"/>
-          </a:p>
-          <a:p>
-            <a:endParaRPr lang="en-IN" dirty="0"/>
           </a:p>
           <a:p>
             <a:endParaRPr lang="en-IN" dirty="0"/>

</xml_diff>